<commit_message>
Updated models for XMI
</commit_message>
<xml_diff>
--- a/Presentations/SIMF_Intro_2016.pptx
+++ b/Presentations/SIMF_Intro_2016.pptx
@@ -5,10 +5,10 @@
     <p:sldMasterId id="2147483684" r:id="rId1"/>
   </p:sldMasterIdLst>
   <p:notesMasterIdLst>
-    <p:notesMasterId r:id="rId13"/>
+    <p:notesMasterId r:id="rId16"/>
   </p:notesMasterIdLst>
   <p:handoutMasterIdLst>
-    <p:handoutMasterId r:id="rId14"/>
+    <p:handoutMasterId r:id="rId17"/>
   </p:handoutMasterIdLst>
   <p:sldIdLst>
     <p:sldId id="256" r:id="rId2"/>
@@ -22,6 +22,9 @@
     <p:sldId id="411" r:id="rId10"/>
     <p:sldId id="412" r:id="rId11"/>
     <p:sldId id="414" r:id="rId12"/>
+    <p:sldId id="415" r:id="rId13"/>
+    <p:sldId id="416" r:id="rId14"/>
+    <p:sldId id="417" r:id="rId15"/>
   </p:sldIdLst>
   <p:sldSz cx="9144000" cy="6858000" type="screen4x3"/>
   <p:notesSz cx="6954838" cy="9240838"/>
@@ -221,7 +224,7 @@
           <a:p>
             <a:fld id="{38E3837F-7B40-4B98-90A9-C161BB7B8FD2}" type="datetimeFigureOut">
               <a:rPr lang="en-US" smtClean="0"/>
-              <a:t>4/20/2016</a:t>
+              <a:t>5/22/2016</a:t>
             </a:fld>
             <a:endParaRPr lang="en-US"/>
           </a:p>
@@ -386,7 +389,7 @@
           <a:p>
             <a:fld id="{C40E5A84-7D87-452D-8FE3-23F521AC3943}" type="datetimeFigureOut">
               <a:rPr lang="en-US" smtClean="0"/>
-              <a:t>4/20/2016</a:t>
+              <a:t>5/22/2016</a:t>
             </a:fld>
             <a:endParaRPr lang="en-US"/>
           </a:p>
@@ -5103,6 +5106,459 @@
       </p:sp>
       <p:pic>
         <p:nvPicPr>
+          <p:cNvPr id="7" name="Picture 6"/>
+          <p:cNvPicPr>
+            <a:picLocks noChangeAspect="1"/>
+          </p:cNvPicPr>
+          <p:nvPr/>
+        </p:nvPicPr>
+        <p:blipFill>
+          <a:blip r:embed="rId2"/>
+          <a:stretch>
+            <a:fillRect/>
+          </a:stretch>
+        </p:blipFill>
+        <p:spPr>
+          <a:xfrm>
+            <a:off x="-3810" y="0"/>
+            <a:ext cx="9251146" cy="6904113"/>
+          </a:xfrm>
+          <a:prstGeom prst="rect">
+            <a:avLst/>
+          </a:prstGeom>
+        </p:spPr>
+      </p:pic>
+    </p:spTree>
+    <p:extLst>
+      <p:ext uri="{BB962C8B-B14F-4D97-AF65-F5344CB8AC3E}">
+        <p14:creationId xmlns:p14="http://schemas.microsoft.com/office/powerpoint/2010/main" val="4261529553"/>
+      </p:ext>
+    </p:extLst>
+  </p:cSld>
+  <p:clrMapOvr>
+    <a:masterClrMapping/>
+  </p:clrMapOvr>
+</p:sld>
+</file>
+
+<file path=ppt/slides/slide12.xml><?xml version="1.0" encoding="utf-8"?>
+<p:sld xmlns:a="http://schemas.openxmlformats.org/drawingml/2006/main" xmlns:r="http://schemas.openxmlformats.org/officeDocument/2006/relationships" xmlns:p="http://schemas.openxmlformats.org/presentationml/2006/main">
+  <p:cSld>
+    <p:spTree>
+      <p:nvGrpSpPr>
+        <p:cNvPr id="1" name=""/>
+        <p:cNvGrpSpPr/>
+        <p:nvPr/>
+      </p:nvGrpSpPr>
+      <p:grpSpPr>
+        <a:xfrm>
+          <a:off x="0" y="0"/>
+          <a:ext cx="0" cy="0"/>
+          <a:chOff x="0" y="0"/>
+          <a:chExt cx="0" cy="0"/>
+        </a:xfrm>
+      </p:grpSpPr>
+      <p:sp>
+        <p:nvSpPr>
+          <p:cNvPr id="6" name="Content Placeholder 5"/>
+          <p:cNvSpPr>
+            <a:spLocks noGrp="1"/>
+          </p:cNvSpPr>
+          <p:nvPr>
+            <p:ph sz="quarter" idx="13"/>
+          </p:nvPr>
+        </p:nvSpPr>
+        <p:spPr/>
+        <p:txBody>
+          <a:bodyPr/>
+          <a:lstStyle/>
+          <a:p>
+            <a:r>
+              <a:rPr lang="en-US" dirty="0"/>
+              <a:t>Pattern based</a:t>
+            </a:r>
+          </a:p>
+          <a:p>
+            <a:r>
+              <a:rPr lang="en-US" dirty="0"/>
+              <a:t>Bi-directional</a:t>
+            </a:r>
+          </a:p>
+          <a:p>
+            <a:r>
+              <a:rPr lang="en-US" dirty="0"/>
+              <a:t>1..n mappings, pivoting through conceptual models</a:t>
+            </a:r>
+          </a:p>
+        </p:txBody>
+      </p:sp>
+      <p:sp>
+        <p:nvSpPr>
+          <p:cNvPr id="2" name="Date Placeholder 1"/>
+          <p:cNvSpPr>
+            <a:spLocks noGrp="1"/>
+          </p:cNvSpPr>
+          <p:nvPr>
+            <p:ph type="dt" sz="half" idx="14"/>
+          </p:nvPr>
+        </p:nvSpPr>
+        <p:spPr/>
+        <p:txBody>
+          <a:bodyPr/>
+          <a:lstStyle/>
+          <a:p>
+            <a:r>
+              <a:rPr lang="en-US"/>
+              <a:t>3/2014</a:t>
+            </a:r>
+            <a:endParaRPr lang="en-US" dirty="0"/>
+          </a:p>
+        </p:txBody>
+      </p:sp>
+      <p:sp>
+        <p:nvSpPr>
+          <p:cNvPr id="3" name="Slide Number Placeholder 2"/>
+          <p:cNvSpPr>
+            <a:spLocks noGrp="1"/>
+          </p:cNvSpPr>
+          <p:nvPr>
+            <p:ph type="sldNum" sz="quarter" idx="15"/>
+          </p:nvPr>
+        </p:nvSpPr>
+        <p:spPr/>
+        <p:txBody>
+          <a:bodyPr/>
+          <a:lstStyle/>
+          <a:p>
+            <a:fld id="{987D7693-E132-40A2-A808-4CF056E677D9}" type="slidenum">
+              <a:rPr lang="en-US" smtClean="0"/>
+              <a:t>12</a:t>
+            </a:fld>
+            <a:endParaRPr lang="en-US" dirty="0"/>
+          </a:p>
+        </p:txBody>
+      </p:sp>
+      <p:sp>
+        <p:nvSpPr>
+          <p:cNvPr id="4" name="Footer Placeholder 3"/>
+          <p:cNvSpPr>
+            <a:spLocks noGrp="1"/>
+          </p:cNvSpPr>
+          <p:nvPr>
+            <p:ph type="ftr" sz="quarter" idx="16"/>
+          </p:nvPr>
+        </p:nvSpPr>
+        <p:spPr/>
+        <p:txBody>
+          <a:bodyPr>
+            <a:normAutofit fontScale="77500" lnSpcReduction="20000"/>
+          </a:bodyPr>
+          <a:lstStyle/>
+          <a:p>
+            <a:r>
+              <a:rPr lang="en-US"/>
+              <a:t>Copyright (c) 2012-2014 Data Access Technologies, Inc. as Model Driven Solutions</a:t>
+            </a:r>
+            <a:endParaRPr lang="en-US" dirty="0"/>
+          </a:p>
+        </p:txBody>
+      </p:sp>
+      <p:sp>
+        <p:nvSpPr>
+          <p:cNvPr id="5" name="Title 4"/>
+          <p:cNvSpPr>
+            <a:spLocks noGrp="1"/>
+          </p:cNvSpPr>
+          <p:nvPr>
+            <p:ph type="title"/>
+          </p:nvPr>
+        </p:nvSpPr>
+        <p:spPr/>
+        <p:txBody>
+          <a:bodyPr/>
+          <a:lstStyle/>
+          <a:p>
+            <a:r>
+              <a:rPr lang="en-US" dirty="0"/>
+              <a:t>Mappings</a:t>
+            </a:r>
+          </a:p>
+        </p:txBody>
+      </p:sp>
+    </p:spTree>
+    <p:extLst>
+      <p:ext uri="{BB962C8B-B14F-4D97-AF65-F5344CB8AC3E}">
+        <p14:creationId xmlns:p14="http://schemas.microsoft.com/office/powerpoint/2010/main" val="4027539291"/>
+      </p:ext>
+    </p:extLst>
+  </p:cSld>
+  <p:clrMapOvr>
+    <a:masterClrMapping/>
+  </p:clrMapOvr>
+</p:sld>
+</file>
+
+<file path=ppt/slides/slide13.xml><?xml version="1.0" encoding="utf-8"?>
+<p:sld xmlns:a="http://schemas.openxmlformats.org/drawingml/2006/main" xmlns:r="http://schemas.openxmlformats.org/officeDocument/2006/relationships" xmlns:p="http://schemas.openxmlformats.org/presentationml/2006/main">
+  <p:cSld>
+    <p:spTree>
+      <p:nvGrpSpPr>
+        <p:cNvPr id="1" name=""/>
+        <p:cNvGrpSpPr/>
+        <p:nvPr/>
+      </p:nvGrpSpPr>
+      <p:grpSpPr>
+        <a:xfrm>
+          <a:off x="0" y="0"/>
+          <a:ext cx="0" cy="0"/>
+          <a:chOff x="0" y="0"/>
+          <a:chExt cx="0" cy="0"/>
+        </a:xfrm>
+      </p:grpSpPr>
+      <p:sp>
+        <p:nvSpPr>
+          <p:cNvPr id="3" name="Date Placeholder 2"/>
+          <p:cNvSpPr>
+            <a:spLocks noGrp="1"/>
+          </p:cNvSpPr>
+          <p:nvPr>
+            <p:ph type="dt" sz="half" idx="10"/>
+          </p:nvPr>
+        </p:nvSpPr>
+        <p:spPr/>
+        <p:txBody>
+          <a:bodyPr/>
+          <a:lstStyle/>
+          <a:p>
+            <a:r>
+              <a:rPr lang="en-US"/>
+              <a:t>3/2014</a:t>
+            </a:r>
+            <a:endParaRPr lang="en-US" dirty="0"/>
+          </a:p>
+        </p:txBody>
+      </p:sp>
+      <p:sp>
+        <p:nvSpPr>
+          <p:cNvPr id="4" name="Slide Number Placeholder 3"/>
+          <p:cNvSpPr>
+            <a:spLocks noGrp="1"/>
+          </p:cNvSpPr>
+          <p:nvPr>
+            <p:ph type="sldNum" sz="quarter" idx="11"/>
+          </p:nvPr>
+        </p:nvSpPr>
+        <p:spPr/>
+        <p:txBody>
+          <a:bodyPr/>
+          <a:lstStyle/>
+          <a:p>
+            <a:fld id="{987D7693-E132-40A2-A808-4CF056E677D9}" type="slidenum">
+              <a:rPr lang="en-US" smtClean="0"/>
+              <a:t>13</a:t>
+            </a:fld>
+            <a:endParaRPr lang="en-US" dirty="0"/>
+          </a:p>
+        </p:txBody>
+      </p:sp>
+      <p:sp>
+        <p:nvSpPr>
+          <p:cNvPr id="5" name="Footer Placeholder 4"/>
+          <p:cNvSpPr>
+            <a:spLocks noGrp="1"/>
+          </p:cNvSpPr>
+          <p:nvPr>
+            <p:ph type="ftr" sz="quarter" idx="12"/>
+          </p:nvPr>
+        </p:nvSpPr>
+        <p:spPr/>
+        <p:txBody>
+          <a:bodyPr>
+            <a:normAutofit fontScale="77500" lnSpcReduction="20000"/>
+          </a:bodyPr>
+          <a:lstStyle/>
+          <a:p>
+            <a:r>
+              <a:rPr lang="en-US"/>
+              <a:t>Copyright (c) 2012-2014 Data Access Technologies, Inc. as Model Driven Solutions</a:t>
+            </a:r>
+            <a:endParaRPr lang="en-US" dirty="0"/>
+          </a:p>
+        </p:txBody>
+      </p:sp>
+      <p:sp>
+        <p:nvSpPr>
+          <p:cNvPr id="8" name="Title 7"/>
+          <p:cNvSpPr>
+            <a:spLocks noGrp="1"/>
+          </p:cNvSpPr>
+          <p:nvPr>
+            <p:ph type="title"/>
+          </p:nvPr>
+        </p:nvSpPr>
+        <p:spPr>
+          <a:xfrm>
+            <a:off x="352426" y="43543"/>
+            <a:ext cx="7680960" cy="718457"/>
+          </a:xfrm>
+        </p:spPr>
+        <p:txBody>
+          <a:bodyPr/>
+          <a:lstStyle/>
+          <a:p>
+            <a:r>
+              <a:rPr lang="en-US" dirty="0"/>
+              <a:t>Mapping Example</a:t>
+            </a:r>
+          </a:p>
+        </p:txBody>
+      </p:sp>
+      <p:pic>
+        <p:nvPicPr>
+          <p:cNvPr id="7" name="Picture 6"/>
+          <p:cNvPicPr>
+            <a:picLocks noChangeAspect="1"/>
+          </p:cNvPicPr>
+          <p:nvPr/>
+        </p:nvPicPr>
+        <p:blipFill>
+          <a:blip r:embed="rId2"/>
+          <a:stretch>
+            <a:fillRect/>
+          </a:stretch>
+        </p:blipFill>
+        <p:spPr>
+          <a:xfrm>
+            <a:off x="-304800" y="1042261"/>
+            <a:ext cx="9753703" cy="5815739"/>
+          </a:xfrm>
+          <a:prstGeom prst="rect">
+            <a:avLst/>
+          </a:prstGeom>
+        </p:spPr>
+      </p:pic>
+    </p:spTree>
+    <p:extLst>
+      <p:ext uri="{BB962C8B-B14F-4D97-AF65-F5344CB8AC3E}">
+        <p14:creationId xmlns:p14="http://schemas.microsoft.com/office/powerpoint/2010/main" val="1446174374"/>
+      </p:ext>
+    </p:extLst>
+  </p:cSld>
+  <p:clrMapOvr>
+    <a:masterClrMapping/>
+  </p:clrMapOvr>
+</p:sld>
+</file>
+
+<file path=ppt/slides/slide14.xml><?xml version="1.0" encoding="utf-8"?>
+<p:sld xmlns:a="http://schemas.openxmlformats.org/drawingml/2006/main" xmlns:r="http://schemas.openxmlformats.org/officeDocument/2006/relationships" xmlns:p="http://schemas.openxmlformats.org/presentationml/2006/main">
+  <p:cSld>
+    <p:spTree>
+      <p:nvGrpSpPr>
+        <p:cNvPr id="1" name=""/>
+        <p:cNvGrpSpPr/>
+        <p:nvPr/>
+      </p:nvGrpSpPr>
+      <p:grpSpPr>
+        <a:xfrm>
+          <a:off x="0" y="0"/>
+          <a:ext cx="0" cy="0"/>
+          <a:chOff x="0" y="0"/>
+          <a:chExt cx="0" cy="0"/>
+        </a:xfrm>
+      </p:grpSpPr>
+      <p:sp>
+        <p:nvSpPr>
+          <p:cNvPr id="2" name="Date Placeholder 1"/>
+          <p:cNvSpPr>
+            <a:spLocks noGrp="1"/>
+          </p:cNvSpPr>
+          <p:nvPr>
+            <p:ph type="dt" sz="half" idx="10"/>
+          </p:nvPr>
+        </p:nvSpPr>
+        <p:spPr/>
+        <p:txBody>
+          <a:bodyPr/>
+          <a:lstStyle/>
+          <a:p>
+            <a:r>
+              <a:rPr lang="en-US"/>
+              <a:t>3/2014</a:t>
+            </a:r>
+            <a:endParaRPr lang="en-US" dirty="0"/>
+          </a:p>
+        </p:txBody>
+      </p:sp>
+      <p:sp>
+        <p:nvSpPr>
+          <p:cNvPr id="3" name="Slide Number Placeholder 2"/>
+          <p:cNvSpPr>
+            <a:spLocks noGrp="1"/>
+          </p:cNvSpPr>
+          <p:nvPr>
+            <p:ph type="sldNum" sz="quarter" idx="11"/>
+          </p:nvPr>
+        </p:nvSpPr>
+        <p:spPr/>
+        <p:txBody>
+          <a:bodyPr/>
+          <a:lstStyle/>
+          <a:p>
+            <a:fld id="{987D7693-E132-40A2-A808-4CF056E677D9}" type="slidenum">
+              <a:rPr lang="en-US" smtClean="0"/>
+              <a:t>14</a:t>
+            </a:fld>
+            <a:endParaRPr lang="en-US" dirty="0"/>
+          </a:p>
+        </p:txBody>
+      </p:sp>
+      <p:sp>
+        <p:nvSpPr>
+          <p:cNvPr id="4" name="Footer Placeholder 3"/>
+          <p:cNvSpPr>
+            <a:spLocks noGrp="1"/>
+          </p:cNvSpPr>
+          <p:nvPr>
+            <p:ph type="ftr" sz="quarter" idx="12"/>
+          </p:nvPr>
+        </p:nvSpPr>
+        <p:spPr/>
+        <p:txBody>
+          <a:bodyPr>
+            <a:normAutofit fontScale="77500" lnSpcReduction="20000"/>
+          </a:bodyPr>
+          <a:lstStyle/>
+          <a:p>
+            <a:r>
+              <a:rPr lang="en-US"/>
+              <a:t>Copyright (c) 2012-2014 Data Access Technologies, Inc. as Model Driven Solutions</a:t>
+            </a:r>
+            <a:endParaRPr lang="en-US" dirty="0"/>
+          </a:p>
+        </p:txBody>
+      </p:sp>
+      <p:sp>
+        <p:nvSpPr>
+          <p:cNvPr id="5" name="Title 4"/>
+          <p:cNvSpPr>
+            <a:spLocks noGrp="1"/>
+          </p:cNvSpPr>
+          <p:nvPr>
+            <p:ph type="title"/>
+          </p:nvPr>
+        </p:nvSpPr>
+        <p:spPr/>
+        <p:txBody>
+          <a:bodyPr/>
+          <a:lstStyle/>
+          <a:p>
+            <a:endParaRPr lang="en-US"/>
+          </a:p>
+        </p:txBody>
+      </p:sp>
+      <p:pic>
+        <p:nvPicPr>
           <p:cNvPr id="6" name="Picture 5"/>
           <p:cNvPicPr>
             <a:picLocks noChangeAspect="1"/>
@@ -5117,8 +5573,8 @@
         </p:blipFill>
         <p:spPr>
           <a:xfrm>
-            <a:off x="11722" y="-381000"/>
-            <a:ext cx="9132277" cy="7789568"/>
+            <a:off x="0" y="-76200"/>
+            <a:ext cx="9372497" cy="7046990"/>
           </a:xfrm>
           <a:prstGeom prst="rect">
             <a:avLst/>
@@ -5128,7 +5584,7 @@
     </p:spTree>
     <p:extLst>
       <p:ext uri="{BB962C8B-B14F-4D97-AF65-F5344CB8AC3E}">
-        <p14:creationId xmlns:p14="http://schemas.microsoft.com/office/powerpoint/2010/main" val="4261529553"/>
+        <p14:creationId xmlns:p14="http://schemas.microsoft.com/office/powerpoint/2010/main" val="1082117825"/>
       </p:ext>
     </p:extLst>
   </p:cSld>
@@ -10221,7 +10677,7 @@
           <a:p>
             <a:fld id="{F178AD1E-6C62-4F7B-8F5C-AB7BDAD6E1C9}" type="datetime1">
               <a:rPr lang="en-US" smtClean="0"/>
-              <a:t>4/20/2016</a:t>
+              <a:t>5/22/2016</a:t>
             </a:fld>
             <a:endParaRPr lang="en-US"/>
           </a:p>

</xml_diff>